<commit_message>
Login angepasst, mit Homepage angefangen.
</commit_message>
<xml_diff>
--- a/src/pics/pics_powerpoint.pptx
+++ b/src/pics/pics_powerpoint.pptx
@@ -6,6 +6,7 @@
   </p:sldMasterIdLst>
   <p:sldIdLst>
     <p:sldId id="256" r:id="rId2"/>
+    <p:sldId id="257" r:id="rId3"/>
   </p:sldIdLst>
   <p:sldSz cx="12192000" cy="6858000"/>
   <p:notesSz cx="6858000" cy="9144000"/>
@@ -104,6 +105,11 @@
       </a:defRPr>
     </a:lvl9pPr>
   </p:defaultTextStyle>
+  <p:extLst>
+    <p:ext uri="{EFAFB233-063F-42B5-8137-9DF3F51BA10A}">
+      <p15:sldGuideLst xmlns:p15="http://schemas.microsoft.com/office/powerpoint/2012/main"/>
+    </p:ext>
+  </p:extLst>
 </p:presentation>
 </file>
 
@@ -254,7 +260,7 @@
           <a:p>
             <a:fld id="{27DD0186-B0A5-4C2D-8DAB-2FF2C82553C4}" type="datetimeFigureOut">
               <a:rPr lang="de-DE" smtClean="0"/>
-              <a:t>03.06.2022</a:t>
+              <a:t>06.06.2022</a:t>
             </a:fld>
             <a:endParaRPr lang="de-DE"/>
           </a:p>
@@ -452,7 +458,7 @@
           <a:p>
             <a:fld id="{27DD0186-B0A5-4C2D-8DAB-2FF2C82553C4}" type="datetimeFigureOut">
               <a:rPr lang="de-DE" smtClean="0"/>
-              <a:t>03.06.2022</a:t>
+              <a:t>06.06.2022</a:t>
             </a:fld>
             <a:endParaRPr lang="de-DE"/>
           </a:p>
@@ -660,7 +666,7 @@
           <a:p>
             <a:fld id="{27DD0186-B0A5-4C2D-8DAB-2FF2C82553C4}" type="datetimeFigureOut">
               <a:rPr lang="de-DE" smtClean="0"/>
-              <a:t>03.06.2022</a:t>
+              <a:t>06.06.2022</a:t>
             </a:fld>
             <a:endParaRPr lang="de-DE"/>
           </a:p>
@@ -858,7 +864,7 @@
           <a:p>
             <a:fld id="{27DD0186-B0A5-4C2D-8DAB-2FF2C82553C4}" type="datetimeFigureOut">
               <a:rPr lang="de-DE" smtClean="0"/>
-              <a:t>03.06.2022</a:t>
+              <a:t>06.06.2022</a:t>
             </a:fld>
             <a:endParaRPr lang="de-DE"/>
           </a:p>
@@ -1133,7 +1139,7 @@
           <a:p>
             <a:fld id="{27DD0186-B0A5-4C2D-8DAB-2FF2C82553C4}" type="datetimeFigureOut">
               <a:rPr lang="de-DE" smtClean="0"/>
-              <a:t>03.06.2022</a:t>
+              <a:t>06.06.2022</a:t>
             </a:fld>
             <a:endParaRPr lang="de-DE"/>
           </a:p>
@@ -1398,7 +1404,7 @@
           <a:p>
             <a:fld id="{27DD0186-B0A5-4C2D-8DAB-2FF2C82553C4}" type="datetimeFigureOut">
               <a:rPr lang="de-DE" smtClean="0"/>
-              <a:t>03.06.2022</a:t>
+              <a:t>06.06.2022</a:t>
             </a:fld>
             <a:endParaRPr lang="de-DE"/>
           </a:p>
@@ -1810,7 +1816,7 @@
           <a:p>
             <a:fld id="{27DD0186-B0A5-4C2D-8DAB-2FF2C82553C4}" type="datetimeFigureOut">
               <a:rPr lang="de-DE" smtClean="0"/>
-              <a:t>03.06.2022</a:t>
+              <a:t>06.06.2022</a:t>
             </a:fld>
             <a:endParaRPr lang="de-DE"/>
           </a:p>
@@ -1951,7 +1957,7 @@
           <a:p>
             <a:fld id="{27DD0186-B0A5-4C2D-8DAB-2FF2C82553C4}" type="datetimeFigureOut">
               <a:rPr lang="de-DE" smtClean="0"/>
-              <a:t>03.06.2022</a:t>
+              <a:t>06.06.2022</a:t>
             </a:fld>
             <a:endParaRPr lang="de-DE"/>
           </a:p>
@@ -2064,7 +2070,7 @@
           <a:p>
             <a:fld id="{27DD0186-B0A5-4C2D-8DAB-2FF2C82553C4}" type="datetimeFigureOut">
               <a:rPr lang="de-DE" smtClean="0"/>
-              <a:t>03.06.2022</a:t>
+              <a:t>06.06.2022</a:t>
             </a:fld>
             <a:endParaRPr lang="de-DE"/>
           </a:p>
@@ -2375,7 +2381,7 @@
           <a:p>
             <a:fld id="{27DD0186-B0A5-4C2D-8DAB-2FF2C82553C4}" type="datetimeFigureOut">
               <a:rPr lang="de-DE" smtClean="0"/>
-              <a:t>03.06.2022</a:t>
+              <a:t>06.06.2022</a:t>
             </a:fld>
             <a:endParaRPr lang="de-DE"/>
           </a:p>
@@ -2663,7 +2669,7 @@
           <a:p>
             <a:fld id="{27DD0186-B0A5-4C2D-8DAB-2FF2C82553C4}" type="datetimeFigureOut">
               <a:rPr lang="de-DE" smtClean="0"/>
-              <a:t>03.06.2022</a:t>
+              <a:t>06.06.2022</a:t>
             </a:fld>
             <a:endParaRPr lang="de-DE"/>
           </a:p>
@@ -2904,7 +2910,7 @@
           <a:p>
             <a:fld id="{27DD0186-B0A5-4C2D-8DAB-2FF2C82553C4}" type="datetimeFigureOut">
               <a:rPr lang="de-DE" smtClean="0"/>
-              <a:t>03.06.2022</a:t>
+              <a:t>06.06.2022</a:t>
             </a:fld>
             <a:endParaRPr lang="de-DE"/>
           </a:p>
@@ -3603,6 +3609,312 @@
 </p:sld>
 </file>
 
+<file path=ppt/slides/slide2.xml><?xml version="1.0" encoding="utf-8"?>
+<p:sld xmlns:a="http://schemas.openxmlformats.org/drawingml/2006/main" xmlns:r="http://schemas.openxmlformats.org/officeDocument/2006/relationships" xmlns:p="http://schemas.openxmlformats.org/presentationml/2006/main">
+  <p:cSld>
+    <p:spTree>
+      <p:nvGrpSpPr>
+        <p:cNvPr id="1" name=""/>
+        <p:cNvGrpSpPr/>
+        <p:nvPr/>
+      </p:nvGrpSpPr>
+      <p:grpSpPr>
+        <a:xfrm>
+          <a:off x="0" y="0"/>
+          <a:ext cx="0" cy="0"/>
+          <a:chOff x="0" y="0"/>
+          <a:chExt cx="0" cy="0"/>
+        </a:xfrm>
+      </p:grpSpPr>
+      <p:sp>
+        <p:nvSpPr>
+          <p:cNvPr id="4" name="Rechteck 3">
+            <a:extLst>
+              <a:ext uri="{FF2B5EF4-FFF2-40B4-BE49-F238E27FC236}">
+                <a16:creationId xmlns:a16="http://schemas.microsoft.com/office/drawing/2014/main" id="{07E4AC41-B75A-36A9-8125-1ECA1566ED05}"/>
+              </a:ext>
+            </a:extLst>
+          </p:cNvPr>
+          <p:cNvSpPr/>
+          <p:nvPr/>
+        </p:nvSpPr>
+        <p:spPr>
+          <a:xfrm>
+            <a:off x="726650" y="490980"/>
+            <a:ext cx="2851609" cy="2851609"/>
+          </a:xfrm>
+          <a:prstGeom prst="rect">
+            <a:avLst/>
+          </a:prstGeom>
+          <a:solidFill>
+            <a:srgbClr val="92D050"/>
+          </a:solidFill>
+          <a:ln>
+            <a:noFill/>
+          </a:ln>
+        </p:spPr>
+        <p:style>
+          <a:lnRef idx="2">
+            <a:schemeClr val="accent1">
+              <a:shade val="50000"/>
+            </a:schemeClr>
+          </a:lnRef>
+          <a:fillRef idx="1">
+            <a:schemeClr val="accent1"/>
+          </a:fillRef>
+          <a:effectRef idx="0">
+            <a:schemeClr val="accent1"/>
+          </a:effectRef>
+          <a:fontRef idx="minor">
+            <a:schemeClr val="lt1"/>
+          </a:fontRef>
+        </p:style>
+        <p:txBody>
+          <a:bodyPr rtlCol="0" anchor="ctr"/>
+          <a:lstStyle/>
+          <a:p>
+            <a:pPr algn="ctr"/>
+            <a:endParaRPr lang="de-DE"/>
+          </a:p>
+        </p:txBody>
+      </p:sp>
+      <p:pic>
+        <p:nvPicPr>
+          <p:cNvPr id="6" name="Grafik 5" descr="Benutzer mit einfarbiger Füllung">
+            <a:extLst>
+              <a:ext uri="{FF2B5EF4-FFF2-40B4-BE49-F238E27FC236}">
+                <a16:creationId xmlns:a16="http://schemas.microsoft.com/office/drawing/2014/main" id="{92C045A9-8818-8A8A-C9C6-2863247AD93D}"/>
+              </a:ext>
+            </a:extLst>
+          </p:cNvPr>
+          <p:cNvPicPr>
+            <a:picLocks noChangeAspect="1"/>
+          </p:cNvPicPr>
+          <p:nvPr/>
+        </p:nvPicPr>
+        <p:blipFill>
+          <a:blip r:embed="rId2">
+            <a:extLst>
+              <a:ext uri="{28A0092B-C50C-407E-A947-70E740481C1C}">
+                <a14:useLocalDpi xmlns:a14="http://schemas.microsoft.com/office/drawing/2010/main" val="0"/>
+              </a:ext>
+              <a:ext uri="{96DAC541-7B7A-43D3-8B79-37D633B846F1}">
+                <asvg:svgBlip xmlns:asvg="http://schemas.microsoft.com/office/drawing/2016/SVG/main" r:embed="rId3"/>
+              </a:ext>
+            </a:extLst>
+          </a:blip>
+          <a:stretch>
+            <a:fillRect/>
+          </a:stretch>
+        </p:blipFill>
+        <p:spPr>
+          <a:xfrm>
+            <a:off x="893191" y="657521"/>
+            <a:ext cx="2518528" cy="2518528"/>
+          </a:xfrm>
+          <a:prstGeom prst="rect">
+            <a:avLst/>
+          </a:prstGeom>
+        </p:spPr>
+      </p:pic>
+      <p:sp>
+        <p:nvSpPr>
+          <p:cNvPr id="8" name="Rechteck 7">
+            <a:extLst>
+              <a:ext uri="{FF2B5EF4-FFF2-40B4-BE49-F238E27FC236}">
+                <a16:creationId xmlns:a16="http://schemas.microsoft.com/office/drawing/2014/main" id="{4C70775C-749D-A4AE-DD2F-F9151A0B1A87}"/>
+              </a:ext>
+            </a:extLst>
+          </p:cNvPr>
+          <p:cNvSpPr/>
+          <p:nvPr/>
+        </p:nvSpPr>
+        <p:spPr>
+          <a:xfrm>
+            <a:off x="5243660" y="490980"/>
+            <a:ext cx="2851609" cy="2851609"/>
+          </a:xfrm>
+          <a:prstGeom prst="rect">
+            <a:avLst/>
+          </a:prstGeom>
+          <a:solidFill>
+            <a:schemeClr val="accent6">
+              <a:lumMod val="60000"/>
+              <a:lumOff val="40000"/>
+            </a:schemeClr>
+          </a:solidFill>
+          <a:ln>
+            <a:noFill/>
+          </a:ln>
+        </p:spPr>
+        <p:style>
+          <a:lnRef idx="2">
+            <a:schemeClr val="accent1">
+              <a:shade val="50000"/>
+            </a:schemeClr>
+          </a:lnRef>
+          <a:fillRef idx="1">
+            <a:schemeClr val="accent1"/>
+          </a:fillRef>
+          <a:effectRef idx="0">
+            <a:schemeClr val="accent1"/>
+          </a:effectRef>
+          <a:fontRef idx="minor">
+            <a:schemeClr val="lt1"/>
+          </a:fontRef>
+        </p:style>
+        <p:txBody>
+          <a:bodyPr rtlCol="0" anchor="ctr"/>
+          <a:lstStyle/>
+          <a:p>
+            <a:pPr algn="ctr"/>
+            <a:endParaRPr lang="de-DE"/>
+          </a:p>
+        </p:txBody>
+      </p:sp>
+      <p:pic>
+        <p:nvPicPr>
+          <p:cNvPr id="10" name="Grafik 9" descr="Benutzer mit einfarbiger Füllung">
+            <a:extLst>
+              <a:ext uri="{FF2B5EF4-FFF2-40B4-BE49-F238E27FC236}">
+                <a16:creationId xmlns:a16="http://schemas.microsoft.com/office/drawing/2014/main" id="{904F8775-77A1-563B-07DF-D54AF4D295CB}"/>
+              </a:ext>
+            </a:extLst>
+          </p:cNvPr>
+          <p:cNvPicPr>
+            <a:picLocks noChangeAspect="1"/>
+          </p:cNvPicPr>
+          <p:nvPr/>
+        </p:nvPicPr>
+        <p:blipFill>
+          <a:blip r:embed="rId2">
+            <a:extLst>
+              <a:ext uri="{28A0092B-C50C-407E-A947-70E740481C1C}">
+                <a14:useLocalDpi xmlns:a14="http://schemas.microsoft.com/office/drawing/2010/main" val="0"/>
+              </a:ext>
+              <a:ext uri="{96DAC541-7B7A-43D3-8B79-37D633B846F1}">
+                <asvg:svgBlip xmlns:asvg="http://schemas.microsoft.com/office/drawing/2016/SVG/main" r:embed="rId3"/>
+              </a:ext>
+            </a:extLst>
+          </a:blip>
+          <a:stretch>
+            <a:fillRect/>
+          </a:stretch>
+        </p:blipFill>
+        <p:spPr>
+          <a:xfrm>
+            <a:off x="5410201" y="657521"/>
+            <a:ext cx="2518528" cy="2518528"/>
+          </a:xfrm>
+          <a:prstGeom prst="rect">
+            <a:avLst/>
+          </a:prstGeom>
+        </p:spPr>
+      </p:pic>
+      <p:sp>
+        <p:nvSpPr>
+          <p:cNvPr id="11" name="Rechteck 10">
+            <a:extLst>
+              <a:ext uri="{FF2B5EF4-FFF2-40B4-BE49-F238E27FC236}">
+                <a16:creationId xmlns:a16="http://schemas.microsoft.com/office/drawing/2014/main" id="{5AAFEA0D-4620-02CF-6B61-4ED49635CD81}"/>
+              </a:ext>
+            </a:extLst>
+          </p:cNvPr>
+          <p:cNvSpPr/>
+          <p:nvPr/>
+        </p:nvSpPr>
+        <p:spPr>
+          <a:xfrm>
+            <a:off x="3817855" y="3515411"/>
+            <a:ext cx="2851609" cy="2851609"/>
+          </a:xfrm>
+          <a:prstGeom prst="rect">
+            <a:avLst/>
+          </a:prstGeom>
+          <a:solidFill>
+            <a:schemeClr val="bg1"/>
+          </a:solidFill>
+          <a:ln>
+            <a:noFill/>
+          </a:ln>
+        </p:spPr>
+        <p:style>
+          <a:lnRef idx="2">
+            <a:schemeClr val="accent1">
+              <a:shade val="50000"/>
+            </a:schemeClr>
+          </a:lnRef>
+          <a:fillRef idx="1">
+            <a:schemeClr val="accent1"/>
+          </a:fillRef>
+          <a:effectRef idx="0">
+            <a:schemeClr val="accent1"/>
+          </a:effectRef>
+          <a:fontRef idx="minor">
+            <a:schemeClr val="lt1"/>
+          </a:fontRef>
+        </p:style>
+        <p:txBody>
+          <a:bodyPr rtlCol="0" anchor="ctr"/>
+          <a:lstStyle/>
+          <a:p>
+            <a:pPr algn="ctr"/>
+            <a:endParaRPr lang="de-DE"/>
+          </a:p>
+        </p:txBody>
+      </p:sp>
+      <p:pic>
+        <p:nvPicPr>
+          <p:cNvPr id="12" name="Grafik 11" descr="Benutzer mit einfarbiger Füllung">
+            <a:extLst>
+              <a:ext uri="{FF2B5EF4-FFF2-40B4-BE49-F238E27FC236}">
+                <a16:creationId xmlns:a16="http://schemas.microsoft.com/office/drawing/2014/main" id="{01DE7D57-3EE0-46E1-D6B0-E66FA74CF0D7}"/>
+              </a:ext>
+            </a:extLst>
+          </p:cNvPr>
+          <p:cNvPicPr>
+            <a:picLocks noChangeAspect="1"/>
+          </p:cNvPicPr>
+          <p:nvPr/>
+        </p:nvPicPr>
+        <p:blipFill>
+          <a:blip r:embed="rId4">
+            <a:extLst>
+              <a:ext uri="{28A0092B-C50C-407E-A947-70E740481C1C}">
+                <a14:useLocalDpi xmlns:a14="http://schemas.microsoft.com/office/drawing/2010/main" val="0"/>
+              </a:ext>
+              <a:ext uri="{96DAC541-7B7A-43D3-8B79-37D633B846F1}">
+                <asvg:svgBlip xmlns:asvg="http://schemas.microsoft.com/office/drawing/2016/SVG/main" r:embed="rId5"/>
+              </a:ext>
+            </a:extLst>
+          </a:blip>
+          <a:stretch>
+            <a:fillRect/>
+          </a:stretch>
+        </p:blipFill>
+        <p:spPr>
+          <a:xfrm>
+            <a:off x="3984396" y="3681952"/>
+            <a:ext cx="2518528" cy="2518528"/>
+          </a:xfrm>
+          <a:prstGeom prst="rect">
+            <a:avLst/>
+          </a:prstGeom>
+        </p:spPr>
+      </p:pic>
+    </p:spTree>
+    <p:extLst>
+      <p:ext uri="{BB962C8B-B14F-4D97-AF65-F5344CB8AC3E}">
+        <p14:creationId xmlns:p14="http://schemas.microsoft.com/office/powerpoint/2010/main" val="3367378128"/>
+      </p:ext>
+    </p:extLst>
+  </p:cSld>
+  <p:clrMapOvr>
+    <a:masterClrMapping/>
+  </p:clrMapOvr>
+</p:sld>
+</file>
+
 <file path=ppt/theme/theme1.xml><?xml version="1.0" encoding="utf-8"?>
 <a:theme xmlns:a="http://schemas.openxmlformats.org/drawingml/2006/main" name="Office">
   <a:themeElements>

</xml_diff>